<commit_message>
Tom 01 Lizenz und stand hinzugefügt
</commit_message>
<xml_diff>
--- a/training-cards/agile moves/Tomatoes (TOM)/ger/apprentice/ger_TOM_01_Aufdrehen_fertig_los_AM_Apprentice.pptx
+++ b/training-cards/agile moves/Tomatoes (TOM)/ger/apprentice/ger_TOM_01_Aufdrehen_fertig_los_AM_Apprentice.pptx
@@ -110,7 +110,7 @@
   </p:defaultTextStyle>
   <p:extLst>
     <p:ext uri="{EFAFB233-063F-42B5-8137-9DF3F51BA10A}">
-      <p15:sldGuideLst xmlns:p15="http://schemas.microsoft.com/office/powerpoint/2012/main" xmlns="">
+      <p15:sldGuideLst xmlns="" xmlns:p15="http://schemas.microsoft.com/office/powerpoint/2012/main">
         <p15:guide id="1" orient="horz" pos="1103">
           <p15:clr>
             <a:srgbClr val="A4A3A4"/>
@@ -209,7 +209,7 @@
           <a:p>
             <a:fld id="{B0CB8B2F-27AE-FC42-9F9A-56AAD34EAFDA}" type="datetimeFigureOut">
               <a:rPr lang="de-DE" smtClean="0"/>
-              <a:t>18.08.15</a:t>
+              <a:t>17.10.15</a:t>
             </a:fld>
             <a:endParaRPr lang="de-DE"/>
           </a:p>
@@ -1178,7 +1178,7 @@
           <a:p>
             <a:fld id="{FF5B2BAF-DF38-0A48-A798-0C06E514FD52}" type="datetimeFigureOut">
               <a:rPr lang="de-DE" smtClean="0"/>
-              <a:t>18.08.15</a:t>
+              <a:t>17.10.15</a:t>
             </a:fld>
             <a:endParaRPr lang="de-DE" dirty="0"/>
           </a:p>
@@ -1448,7 +1448,7 @@
           <a:p>
             <a:fld id="{FF5B2BAF-DF38-0A48-A798-0C06E514FD52}" type="datetimeFigureOut">
               <a:rPr lang="de-DE" smtClean="0"/>
-              <a:t>18.08.15</a:t>
+              <a:t>17.10.15</a:t>
             </a:fld>
             <a:endParaRPr lang="de-DE" dirty="0"/>
           </a:p>
@@ -2074,22 +2074,18 @@
               <a:t>AUFDREHEN </a:t>
             </a:r>
             <a:r>
-              <a:rPr lang="de-DE" smtClean="0"/>
-              <a:t>-</a:t>
-            </a:r>
-            <a:r>
               <a:rPr lang="de-DE" smtClean="0">
                 <a:latin typeface="Avenir Light"/>
                 <a:cs typeface="Avenir Light"/>
               </a:rPr>
-              <a:t> </a:t>
+              <a:t>- FERTIG </a:t>
             </a:r>
             <a:r>
               <a:rPr lang="de-DE" dirty="0" smtClean="0">
                 <a:latin typeface="Avenir Light"/>
                 <a:cs typeface="Avenir Light"/>
               </a:rPr>
-              <a:t>FERTIG - LOS</a:t>
+              <a:t>- LOS</a:t>
             </a:r>
             <a:endParaRPr lang="de-DE" dirty="0">
               <a:latin typeface="Avenir Light"/>
@@ -2281,7 +2277,7 @@
         </p:nvSpPr>
         <p:spPr>
           <a:xfrm>
-            <a:off x="5086569" y="4776480"/>
+            <a:off x="5336513" y="4813721"/>
             <a:ext cx="1775894" cy="283817"/>
           </a:xfrm>
           <a:prstGeom prst="rect">
@@ -2484,7 +2480,17 @@
                 <a:latin typeface="Avenir Book"/>
                 <a:cs typeface="Avenir Book"/>
               </a:rPr>
-              <a:t> BRANDHUBER</a:t>
+              <a:t> </a:t>
+            </a:r>
+            <a:r>
+              <a:rPr lang="de-DE" sz="1000" baseline="0" dirty="0" smtClean="0">
+                <a:solidFill>
+                  <a:srgbClr val="5D5E5F"/>
+                </a:solidFill>
+                <a:latin typeface="Avenir Book"/>
+                <a:cs typeface="Avenir Book"/>
+              </a:rPr>
+              <a:t>BRANDHUBER, zuletzt geändert am 17.10.2015</a:t>
             </a:r>
             <a:r>
               <a:rPr lang="de-DE" sz="1000" dirty="0" smtClean="0">
@@ -2606,19 +2612,11 @@
             </a:r>
             <a:r>
               <a:rPr lang="de-DE" sz="1200" dirty="0"/>
-              <a:t>Wochen </a:t>
-            </a:r>
-            <a:r>
-              <a:rPr lang="de-DE" sz="1200"/>
-              <a:t>mindestens </a:t>
-            </a:r>
-            <a:r>
-              <a:rPr lang="de-DE" sz="1200" smtClean="0"/>
-              <a:t>zwölf </a:t>
+              <a:t>Wochen mindestens </a:t>
             </a:r>
             <a:r>
               <a:rPr lang="de-DE" sz="1200" dirty="0" smtClean="0"/>
-              <a:t>Tomaten</a:t>
+              <a:t>zwölf Tomaten</a:t>
             </a:r>
             <a:r>
               <a:rPr lang="de-DE" sz="1200" dirty="0"/>
@@ -2712,16 +2710,120 @@
           </a:p>
         </p:txBody>
       </p:sp>
+      <p:sp>
+        <p:nvSpPr>
+          <p:cNvPr id="4" name="Shape 7"/>
+          <p:cNvSpPr/>
+          <p:nvPr/>
+        </p:nvSpPr>
+        <p:spPr>
+          <a:xfrm>
+            <a:off x="1790352" y="4952581"/>
+            <a:ext cx="3823764" cy="294639"/>
+          </a:xfrm>
+          <a:prstGeom prst="rect">
+            <a:avLst/>
+          </a:prstGeom>
+          <a:ln w="12700">
+            <a:miter lim="400000"/>
+          </a:ln>
+          <a:extLst>
+            <a:ext uri="{C572A759-6A51-4108-AA02-DFA0A04FC94B}">
+              <ma14:wrappingTextBoxFlag xmlns:ma14="http://schemas.microsoft.com/office/mac/drawingml/2011/main" val="1"/>
+            </a:ext>
+          </a:extLst>
+        </p:spPr>
+        <p:txBody>
+          <a:bodyPr wrap="none" lIns="45718" tIns="45718" rIns="45718" bIns="45718">
+            <a:spAutoFit/>
+          </a:bodyPr>
+          <a:lstStyle/>
+          <a:p>
+            <a:pPr lvl="0" algn="ctr">
+              <a:defRPr sz="1800"/>
+            </a:pPr>
+            <a:r>
+              <a:rPr sz="600" dirty="0">
+                <a:latin typeface="Calibri"/>
+                <a:ea typeface="Calibri"/>
+                <a:cs typeface="Calibri"/>
+                <a:sym typeface="Calibri"/>
+              </a:rPr>
+              <a:t>This work is licensed under the Creative Commons Attribution-NonCommercial-NoDerivatives 4.0 International License. </a:t>
+            </a:r>
+          </a:p>
+          <a:p>
+            <a:pPr lvl="0" algn="ctr">
+              <a:defRPr sz="1800"/>
+            </a:pPr>
+            <a:r>
+              <a:rPr sz="600" dirty="0">
+                <a:latin typeface="Calibri"/>
+                <a:ea typeface="Calibri"/>
+                <a:cs typeface="Calibri"/>
+                <a:sym typeface="Calibri"/>
+              </a:rPr>
+              <a:t>To view a copy of this license, visit </a:t>
+            </a:r>
+            <a:r>
+              <a:rPr sz="600" dirty="0">
+                <a:latin typeface="Calibri"/>
+                <a:ea typeface="Calibri"/>
+                <a:cs typeface="Calibri"/>
+                <a:sym typeface="Calibri"/>
+                <a:hlinkClick r:id="rId2"/>
+              </a:rPr>
+              <a:t>http://creativecommons.org/licenses/by-nc-nd/4.0/</a:t>
+            </a:r>
+            <a:r>
+              <a:rPr sz="600" dirty="0">
+                <a:latin typeface="Calibri"/>
+                <a:ea typeface="Calibri"/>
+                <a:cs typeface="Calibri"/>
+                <a:sym typeface="Calibri"/>
+              </a:rPr>
+              <a:t>.</a:t>
+            </a:r>
+          </a:p>
+        </p:txBody>
+      </p:sp>
       <p:pic>
         <p:nvPicPr>
-          <p:cNvPr id="3" name="Bild 2" descr="am_Icon_apprentice.pdf"/>
+          <p:cNvPr id="5" name="pasted-image.tif"/>
+          <p:cNvPicPr/>
+          <p:nvPr/>
+        </p:nvPicPr>
+        <p:blipFill>
+          <a:blip r:embed="rId3">
+            <a:extLst/>
+          </a:blip>
+          <a:stretch>
+            <a:fillRect/>
+          </a:stretch>
+        </p:blipFill>
+        <p:spPr>
+          <a:xfrm>
+            <a:off x="6174185" y="4992838"/>
+            <a:ext cx="886619" cy="214128"/>
+          </a:xfrm>
+          <a:prstGeom prst="rect">
+            <a:avLst/>
+          </a:prstGeom>
+          <a:ln w="12700">
+            <a:miter lim="400000"/>
+          </a:ln>
+        </p:spPr>
+      </p:pic>
+      <p:pic>
+        <p:nvPicPr>
+          <p:cNvPr id="6" name="Bild 5" descr="am_Icon_apprentice.pdf"/>
           <p:cNvPicPr>
             <a:picLocks noChangeAspect="1"/>
           </p:cNvPicPr>
           <p:nvPr/>
         </p:nvPicPr>
         <p:blipFill>
-          <a:blip>
+          <a:blip r:embed="rId4">
             <a:extLst>
               <a:ext uri="{28A0092B-C50C-407E-A947-70E740481C1C}">
                 <a14:useLocalDpi xmlns:a14="http://schemas.microsoft.com/office/drawing/2010/main" val="0"/>
@@ -2734,7 +2836,7 @@
         </p:blipFill>
         <p:spPr>
           <a:xfrm>
-            <a:off x="5871372" y="3775185"/>
+            <a:off x="5419739" y="3775185"/>
             <a:ext cx="939800" cy="914400"/>
           </a:xfrm>
           <a:prstGeom prst="rect">

</xml_diff>